<commit_message>
Minor update to lecture slides, prior to lecture 2.
</commit_message>
<xml_diff>
--- a/docs/slides/02/02_stack_queue.pptx
+++ b/docs/slides/02/02_stack_queue.pptx
@@ -667,6 +667,67 @@
           <a:bodyPr/>
           <a:lstStyle/>
           <a:p>
+            <a:endParaRPr lang="en-GB" dirty="0"/>
+          </a:p>
+        </p:txBody>
+      </p:sp>
+    </p:spTree>
+    <p:extLst>
+      <p:ext uri="{BB962C8B-B14F-4D97-AF65-F5344CB8AC3E}">
+        <p14:creationId xmlns:p14="http://schemas.microsoft.com/office/powerpoint/2010/main" val="2311335209"/>
+      </p:ext>
+    </p:extLst>
+  </p:cSld>
+  <p:clrMapOvr>
+    <a:masterClrMapping/>
+  </p:clrMapOvr>
+</p:notes>
+</file>
+
+<file path=ppt/notesSlides/notesSlide3.xml><?xml version="1.0" encoding="utf-8"?>
+<p:notes xmlns:a="http://schemas.openxmlformats.org/drawingml/2006/main" xmlns:r="http://schemas.openxmlformats.org/officeDocument/2006/relationships" xmlns:p="http://schemas.openxmlformats.org/presentationml/2006/main">
+  <p:cSld>
+    <p:spTree>
+      <p:nvGrpSpPr>
+        <p:cNvPr id="1" name=""/>
+        <p:cNvGrpSpPr/>
+        <p:nvPr/>
+      </p:nvGrpSpPr>
+      <p:grpSpPr>
+        <a:xfrm>
+          <a:off x="0" y="0"/>
+          <a:ext cx="0" cy="0"/>
+          <a:chOff x="0" y="0"/>
+          <a:chExt cx="0" cy="0"/>
+        </a:xfrm>
+      </p:grpSpPr>
+      <p:sp>
+        <p:nvSpPr>
+          <p:cNvPr id="2" name="Slide Image Placeholder 1"/>
+          <p:cNvSpPr>
+            <a:spLocks noGrp="1" noRot="1" noChangeAspect="1"/>
+          </p:cNvSpPr>
+          <p:nvPr>
+            <p:ph type="sldImg"/>
+          </p:nvPr>
+        </p:nvSpPr>
+        <p:spPr/>
+      </p:sp>
+      <p:sp>
+        <p:nvSpPr>
+          <p:cNvPr id="3" name="Notes Placeholder 2"/>
+          <p:cNvSpPr>
+            <a:spLocks noGrp="1"/>
+          </p:cNvSpPr>
+          <p:nvPr>
+            <p:ph type="body" idx="1"/>
+          </p:nvPr>
+        </p:nvSpPr>
+        <p:spPr/>
+        <p:txBody>
+          <a:bodyPr/>
+          <a:lstStyle/>
+          <a:p>
             <a:endParaRPr lang="en-US" dirty="0"/>
           </a:p>
         </p:txBody>
@@ -2339,7 +2400,7 @@
           </a:ln>
           <a:extLst>
             <a:ext uri="{C572A759-6A51-4108-AA02-DFA0A04FC94B}">
-              <ma14:wrappingTextBoxFlag xmlns="" xmlns:ma14="http://schemas.microsoft.com/office/mac/drawingml/2011/main" val="1"/>
+              <ma14:wrappingTextBoxFlag xmlns:ma14="http://schemas.microsoft.com/office/mac/drawingml/2011/main" xmlns="" val="1"/>
             </a:ext>
           </a:extLst>
         </p:spPr>
@@ -2378,7 +2439,7 @@
           </a:ln>
           <a:extLst>
             <a:ext uri="{C572A759-6A51-4108-AA02-DFA0A04FC94B}">
-              <ma14:wrappingTextBoxFlag xmlns="" xmlns:ma14="http://schemas.microsoft.com/office/mac/drawingml/2011/main" val="1"/>
+              <ma14:wrappingTextBoxFlag xmlns:ma14="http://schemas.microsoft.com/office/mac/drawingml/2011/main" xmlns="" val="1"/>
             </a:ext>
           </a:extLst>
         </p:spPr>
@@ -3348,13 +3409,14 @@
           <a:p>
             <a:pPr algn="r"/>
             <a:r>
-              <a:rPr lang="en-US"/>
-              <a:t>Prof. </a:t>
-            </a:r>
-            <a:r>
               <a:rPr lang="en-US" dirty="0"/>
-              <a:t>Andrea Arcuri</a:t>
-            </a:r>
+              <a:t>Bogdan </a:t>
+            </a:r>
+            <a:r>
+              <a:rPr lang="en-US" dirty="0" err="1"/>
+              <a:t>Marculescu</a:t>
+            </a:r>
+            <a:endParaRPr lang="en-US" dirty="0"/>
           </a:p>
         </p:txBody>
       </p:sp>
@@ -6916,9 +6978,7 @@
           <p:cNvGraphicFramePr>
             <a:graphicFrameLocks noGrp="1"/>
           </p:cNvGraphicFramePr>
-          <p:nvPr>
-            <p:extLst/>
-          </p:nvPr>
+          <p:nvPr/>
         </p:nvGraphicFramePr>
         <p:xfrm>
           <a:off x="922867" y="2603500"/>
@@ -8321,9 +8381,7 @@
           <p:cNvGraphicFramePr>
             <a:graphicFrameLocks noGrp="1"/>
           </p:cNvGraphicFramePr>
-          <p:nvPr>
-            <p:extLst/>
-          </p:nvPr>
+          <p:nvPr/>
         </p:nvGraphicFramePr>
         <p:xfrm>
           <a:off x="8915400" y="5095875"/>
@@ -9149,9 +9207,7 @@
           <p:cNvGraphicFramePr>
             <a:graphicFrameLocks noGrp="1"/>
           </p:cNvGraphicFramePr>
-          <p:nvPr>
-            <p:extLst/>
-          </p:nvPr>
+          <p:nvPr/>
         </p:nvGraphicFramePr>
         <p:xfrm>
           <a:off x="8810625" y="3133725"/>
@@ -10207,9 +10263,7 @@
           <p:cNvGraphicFramePr>
             <a:graphicFrameLocks noGrp="1"/>
           </p:cNvGraphicFramePr>
-          <p:nvPr>
-            <p:extLst/>
-          </p:nvPr>
+          <p:nvPr/>
         </p:nvGraphicFramePr>
         <p:xfrm>
           <a:off x="8915400" y="5095875"/>
@@ -10543,9 +10597,7 @@
           <p:cNvGraphicFramePr>
             <a:graphicFrameLocks noGrp="1"/>
           </p:cNvGraphicFramePr>
-          <p:nvPr>
-            <p:extLst/>
-          </p:nvPr>
+          <p:nvPr/>
         </p:nvGraphicFramePr>
         <p:xfrm>
           <a:off x="614891" y="2901244"/>
@@ -10830,9 +10882,7 @@
           <p:cNvGraphicFramePr>
             <a:graphicFrameLocks noGrp="1"/>
           </p:cNvGraphicFramePr>
-          <p:nvPr>
-            <p:extLst/>
-          </p:nvPr>
+          <p:nvPr/>
         </p:nvGraphicFramePr>
         <p:xfrm>
           <a:off x="5323945" y="2897363"/>
@@ -11133,9 +11183,7 @@
           <p:cNvGraphicFramePr>
             <a:graphicFrameLocks noGrp="1"/>
           </p:cNvGraphicFramePr>
-          <p:nvPr>
-            <p:extLst/>
-          </p:nvPr>
+          <p:nvPr/>
         </p:nvGraphicFramePr>
         <p:xfrm>
           <a:off x="9829800" y="2901244"/>
@@ -11439,7 +11487,7 @@
           </a:ln>
           <a:extLst>
             <a:ext uri="{C572A759-6A51-4108-AA02-DFA0A04FC94B}">
-              <ma14:wrappingTextBoxFlag xmlns:ma14="http://schemas.microsoft.com/office/mac/drawingml/2011/main" xmlns="" val="1"/>
+              <ma14:wrappingTextBoxFlag xmlns="" xmlns:ma14="http://schemas.microsoft.com/office/mac/drawingml/2011/main" val="1"/>
             </a:ext>
           </a:extLst>
         </p:spPr>
@@ -13573,9 +13621,7 @@
           <p:cNvGraphicFramePr>
             <a:graphicFrameLocks noGrp="1"/>
           </p:cNvGraphicFramePr>
-          <p:nvPr>
-            <p:extLst/>
-          </p:nvPr>
+          <p:nvPr/>
         </p:nvGraphicFramePr>
         <p:xfrm>
           <a:off x="952500" y="4158544"/>
@@ -14360,9 +14406,7 @@
           <p:cNvGraphicFramePr>
             <a:graphicFrameLocks noGrp="1"/>
           </p:cNvGraphicFramePr>
-          <p:nvPr>
-            <p:extLst/>
-          </p:nvPr>
+          <p:nvPr/>
         </p:nvGraphicFramePr>
         <p:xfrm>
           <a:off x="952500" y="4472869"/>
@@ -15643,9 +15687,7 @@
           <p:cNvGraphicFramePr>
             <a:graphicFrameLocks noGrp="1"/>
           </p:cNvGraphicFramePr>
-          <p:nvPr>
-            <p:extLst/>
-          </p:nvPr>
+          <p:nvPr/>
         </p:nvGraphicFramePr>
         <p:xfrm>
           <a:off x="952500" y="4472869"/>
@@ -17710,9 +17752,7 @@
           <p:cNvGraphicFramePr>
             <a:graphicFrameLocks noGrp="1"/>
           </p:cNvGraphicFramePr>
-          <p:nvPr>
-            <p:extLst/>
-          </p:nvPr>
+          <p:nvPr/>
         </p:nvGraphicFramePr>
         <p:xfrm>
           <a:off x="424905" y="7048392"/>
@@ -19027,9 +19067,7 @@
           <p:cNvGraphicFramePr>
             <a:graphicFrameLocks noGrp="1"/>
           </p:cNvGraphicFramePr>
-          <p:nvPr>
-            <p:extLst/>
-          </p:nvPr>
+          <p:nvPr/>
         </p:nvGraphicFramePr>
         <p:xfrm>
           <a:off x="424905" y="1419117"/>
@@ -20167,9 +20205,7 @@
           <p:cNvGraphicFramePr>
             <a:graphicFrameLocks noGrp="1"/>
           </p:cNvGraphicFramePr>
-          <p:nvPr>
-            <p:extLst/>
-          </p:nvPr>
+          <p:nvPr/>
         </p:nvGraphicFramePr>
         <p:xfrm>
           <a:off x="439191" y="7315092"/>
@@ -21543,9 +21579,7 @@
           <p:cNvGraphicFramePr>
             <a:graphicFrameLocks noGrp="1"/>
           </p:cNvGraphicFramePr>
-          <p:nvPr>
-            <p:extLst/>
-          </p:nvPr>
+          <p:nvPr/>
         </p:nvGraphicFramePr>
         <p:xfrm>
           <a:off x="273546" y="1295292"/>
@@ -35812,9 +35846,7 @@
           <p:cNvGraphicFramePr>
             <a:graphicFrameLocks noGrp="1"/>
           </p:cNvGraphicFramePr>
-          <p:nvPr>
-            <p:extLst/>
-          </p:nvPr>
+          <p:nvPr/>
         </p:nvGraphicFramePr>
         <p:xfrm>
           <a:off x="7824246" y="3073138"/>

</xml_diff>